<commit_message>
Updates related to the rspatial-env module
</commit_message>
<xml_diff>
--- a/documents/Using R on Taito.pptx
+++ b/documents/Using R on Taito.pptx
@@ -285,7 +285,7 @@
               <a:pPr>
                 <a:defRPr/>
               </a:pPr>
-              <a:t>3/28/2017</a:t>
+              <a:t>9/4/2017</a:t>
             </a:fld>
             <a:endParaRPr lang="en-US" dirty="0">
               <a:latin typeface="Corbel"/>
@@ -517,7 +517,7 @@
               <a:pPr>
                 <a:defRPr/>
               </a:pPr>
-              <a:t>3/28/2017</a:t>
+              <a:t>9/4/2017</a:t>
             </a:fld>
             <a:endParaRPr lang="en-US" dirty="0"/>
           </a:p>
@@ -10470,14 +10470,14 @@
           </a:ln>
           <a:extLst>
             <a:ext uri="{909E8E84-426E-40dd-AFC4-6F175D3DCCD1}">
-              <a14:hiddenFill xmlns:a14="http://schemas.microsoft.com/office/drawing/2010/main" xmlns="">
+              <a14:hiddenFill xmlns="" xmlns:a14="http://schemas.microsoft.com/office/drawing/2010/main">
                 <a:solidFill>
                   <a:srgbClr val="FFFFFF"/>
                 </a:solidFill>
               </a14:hiddenFill>
             </a:ext>
             <a:ext uri="{91240B29-F687-4f45-9708-019B960494DF}">
-              <a14:hiddenLine xmlns:a14="http://schemas.microsoft.com/office/drawing/2010/main" xmlns="" w="9525">
+              <a14:hiddenLine xmlns="" xmlns:a14="http://schemas.microsoft.com/office/drawing/2010/main" w="9525">
                 <a:solidFill>
                   <a:srgbClr val="000000"/>
                 </a:solidFill>
@@ -10487,7 +10487,7 @@
               </a14:hiddenLine>
             </a:ext>
             <a:ext uri="{FAA26D3D-D897-4be2-8F04-BA451C77F1D7}">
-              <ma14:placeholderFlag xmlns:ma14="http://schemas.microsoft.com/office/mac/drawingml/2011/main" xmlns="" val="1"/>
+              <ma14:placeholderFlag xmlns="" xmlns:ma14="http://schemas.microsoft.com/office/mac/drawingml/2011/main" val="1"/>
             </a:ext>
           </a:extLst>
         </p:spPr>
@@ -13748,7 +13748,7 @@
             <a:effectLst/>
             <a:extLst>
               <a:ext uri="{91240B29-F687-4f45-9708-019B960494DF}">
-                <a14:hiddenLine xmlns:a14="http://schemas.microsoft.com/office/drawing/2010/main" xmlns="" w="9525" cap="flat">
+                <a14:hiddenLine xmlns="" xmlns:a14="http://schemas.microsoft.com/office/drawing/2010/main" w="9525" cap="flat">
                   <a:solidFill>
                     <a:srgbClr val="808080"/>
                   </a:solidFill>
@@ -13758,7 +13758,7 @@
                 </a14:hiddenLine>
               </a:ext>
               <a:ext uri="{AF507438-7753-43e0-B8FC-AC1667EBCBE1}">
-                <a14:hiddenEffects xmlns:a14="http://schemas.microsoft.com/office/drawing/2010/main" xmlns="">
+                <a14:hiddenEffects xmlns="" xmlns:a14="http://schemas.microsoft.com/office/drawing/2010/main">
                   <a:effectLst>
                     <a:outerShdw blurRad="63500" dist="38099" dir="2700000" algn="ctr" rotWithShape="0">
                       <a:srgbClr val="000000">
@@ -13956,7 +13956,7 @@
             <a:effectLst/>
             <a:extLst>
               <a:ext uri="{91240B29-F687-4f45-9708-019B960494DF}">
-                <a14:hiddenLine xmlns:a14="http://schemas.microsoft.com/office/drawing/2010/main" xmlns="" w="9525" cap="flat">
+                <a14:hiddenLine xmlns="" xmlns:a14="http://schemas.microsoft.com/office/drawing/2010/main" w="9525" cap="flat">
                   <a:solidFill>
                     <a:srgbClr val="808080"/>
                   </a:solidFill>
@@ -13966,7 +13966,7 @@
                 </a14:hiddenLine>
               </a:ext>
               <a:ext uri="{AF507438-7753-43e0-B8FC-AC1667EBCBE1}">
-                <a14:hiddenEffects xmlns:a14="http://schemas.microsoft.com/office/drawing/2010/main" xmlns="">
+                <a14:hiddenEffects xmlns="" xmlns:a14="http://schemas.microsoft.com/office/drawing/2010/main">
                   <a:effectLst>
                     <a:outerShdw blurRad="63500" dist="38099" dir="2700000" algn="ctr" rotWithShape="0">
                       <a:srgbClr val="000000">
@@ -14085,7 +14085,7 @@
             <a:effectLst/>
             <a:extLst>
               <a:ext uri="{91240B29-F687-4f45-9708-019B960494DF}">
-                <a14:hiddenLine xmlns:a14="http://schemas.microsoft.com/office/drawing/2010/main" xmlns="" w="9525" cap="flat">
+                <a14:hiddenLine xmlns="" xmlns:a14="http://schemas.microsoft.com/office/drawing/2010/main" w="9525" cap="flat">
                   <a:solidFill>
                     <a:srgbClr val="808080"/>
                   </a:solidFill>
@@ -14095,7 +14095,7 @@
                 </a14:hiddenLine>
               </a:ext>
               <a:ext uri="{AF507438-7753-43e0-B8FC-AC1667EBCBE1}">
-                <a14:hiddenEffects xmlns:a14="http://schemas.microsoft.com/office/drawing/2010/main" xmlns="">
+                <a14:hiddenEffects xmlns="" xmlns:a14="http://schemas.microsoft.com/office/drawing/2010/main">
                   <a:effectLst>
                     <a:outerShdw blurRad="63500" dist="38099" dir="2700000" algn="ctr" rotWithShape="0">
                       <a:srgbClr val="000000">
@@ -14367,7 +14367,7 @@
             <a:effectLst/>
             <a:extLst>
               <a:ext uri="{91240B29-F687-4f45-9708-019B960494DF}">
-                <a14:hiddenLine xmlns:a14="http://schemas.microsoft.com/office/drawing/2010/main" xmlns="" w="9525" cap="flat">
+                <a14:hiddenLine xmlns="" xmlns:a14="http://schemas.microsoft.com/office/drawing/2010/main" w="9525" cap="flat">
                   <a:solidFill>
                     <a:srgbClr val="808080"/>
                   </a:solidFill>
@@ -14377,7 +14377,7 @@
                 </a14:hiddenLine>
               </a:ext>
               <a:ext uri="{AF507438-7753-43e0-B8FC-AC1667EBCBE1}">
-                <a14:hiddenEffects xmlns:a14="http://schemas.microsoft.com/office/drawing/2010/main" xmlns="">
+                <a14:hiddenEffects xmlns="" xmlns:a14="http://schemas.microsoft.com/office/drawing/2010/main">
                   <a:effectLst>
                     <a:outerShdw blurRad="63500" dist="38099" dir="2700000" algn="ctr" rotWithShape="0">
                       <a:srgbClr val="000000">
@@ -14496,7 +14496,7 @@
             <a:effectLst/>
             <a:extLst>
               <a:ext uri="{91240B29-F687-4f45-9708-019B960494DF}">
-                <a14:hiddenLine xmlns:a14="http://schemas.microsoft.com/office/drawing/2010/main" xmlns="" w="9525" cap="flat">
+                <a14:hiddenLine xmlns="" xmlns:a14="http://schemas.microsoft.com/office/drawing/2010/main" w="9525" cap="flat">
                   <a:solidFill>
                     <a:srgbClr val="808080"/>
                   </a:solidFill>
@@ -14506,7 +14506,7 @@
                 </a14:hiddenLine>
               </a:ext>
               <a:ext uri="{AF507438-7753-43e0-B8FC-AC1667EBCBE1}">
-                <a14:hiddenEffects xmlns:a14="http://schemas.microsoft.com/office/drawing/2010/main" xmlns="">
+                <a14:hiddenEffects xmlns="" xmlns:a14="http://schemas.microsoft.com/office/drawing/2010/main">
                   <a:effectLst>
                     <a:outerShdw blurRad="63500" dist="38099" dir="2700000" algn="ctr" rotWithShape="0">
                       <a:srgbClr val="000000">
@@ -14692,7 +14692,7 @@
             <a:effectLst/>
             <a:extLst>
               <a:ext uri="{91240B29-F687-4f45-9708-019B960494DF}">
-                <a14:hiddenLine xmlns:a14="http://schemas.microsoft.com/office/drawing/2010/main" xmlns="" w="9525" cap="flat">
+                <a14:hiddenLine xmlns="" xmlns:a14="http://schemas.microsoft.com/office/drawing/2010/main" w="9525" cap="flat">
                   <a:solidFill>
                     <a:srgbClr val="808080"/>
                   </a:solidFill>
@@ -14702,7 +14702,7 @@
                 </a14:hiddenLine>
               </a:ext>
               <a:ext uri="{AF507438-7753-43e0-B8FC-AC1667EBCBE1}">
-                <a14:hiddenEffects xmlns:a14="http://schemas.microsoft.com/office/drawing/2010/main" xmlns="">
+                <a14:hiddenEffects xmlns="" xmlns:a14="http://schemas.microsoft.com/office/drawing/2010/main">
                   <a:effectLst>
                     <a:outerShdw blurRad="63500" dist="38099" dir="2700000" algn="ctr" rotWithShape="0">
                       <a:srgbClr val="000000">
@@ -14928,7 +14928,7 @@
             <a:effectLst/>
             <a:extLst>
               <a:ext uri="{91240B29-F687-4f45-9708-019B960494DF}">
-                <a14:hiddenLine xmlns:a14="http://schemas.microsoft.com/office/drawing/2010/main" xmlns="" w="9525" cap="flat">
+                <a14:hiddenLine xmlns="" xmlns:a14="http://schemas.microsoft.com/office/drawing/2010/main" w="9525" cap="flat">
                   <a:solidFill>
                     <a:srgbClr val="808080"/>
                   </a:solidFill>
@@ -14938,7 +14938,7 @@
                 </a14:hiddenLine>
               </a:ext>
               <a:ext uri="{AF507438-7753-43e0-B8FC-AC1667EBCBE1}">
-                <a14:hiddenEffects xmlns:a14="http://schemas.microsoft.com/office/drawing/2010/main" xmlns="">
+                <a14:hiddenEffects xmlns="" xmlns:a14="http://schemas.microsoft.com/office/drawing/2010/main">
                   <a:effectLst>
                     <a:outerShdw blurRad="63500" dist="38099" dir="2700000" algn="ctr" rotWithShape="0">
                       <a:srgbClr val="000000">
@@ -15076,7 +15076,7 @@
             <a:effectLst/>
             <a:extLst>
               <a:ext uri="{91240B29-F687-4f45-9708-019B960494DF}">
-                <a14:hiddenLine xmlns:a14="http://schemas.microsoft.com/office/drawing/2010/main" xmlns="" w="9525" cap="flat">
+                <a14:hiddenLine xmlns="" xmlns:a14="http://schemas.microsoft.com/office/drawing/2010/main" w="9525" cap="flat">
                   <a:solidFill>
                     <a:srgbClr val="808080"/>
                   </a:solidFill>
@@ -15086,7 +15086,7 @@
                 </a14:hiddenLine>
               </a:ext>
               <a:ext uri="{AF507438-7753-43e0-B8FC-AC1667EBCBE1}">
-                <a14:hiddenEffects xmlns:a14="http://schemas.microsoft.com/office/drawing/2010/main" xmlns="">
+                <a14:hiddenEffects xmlns="" xmlns:a14="http://schemas.microsoft.com/office/drawing/2010/main">
                   <a:effectLst>
                     <a:outerShdw blurRad="63500" dist="38099" dir="2700000" algn="ctr" rotWithShape="0">
                       <a:srgbClr val="000000">
@@ -15372,7 +15372,7 @@
             <a:effectLst/>
             <a:extLst>
               <a:ext uri="{91240B29-F687-4f45-9708-019B960494DF}">
-                <a14:hiddenLine xmlns:a14="http://schemas.microsoft.com/office/drawing/2010/main" xmlns="" w="9525" cap="flat">
+                <a14:hiddenLine xmlns="" xmlns:a14="http://schemas.microsoft.com/office/drawing/2010/main" w="9525" cap="flat">
                   <a:solidFill>
                     <a:srgbClr val="808080"/>
                   </a:solidFill>
@@ -15382,7 +15382,7 @@
                 </a14:hiddenLine>
               </a:ext>
               <a:ext uri="{AF507438-7753-43e0-B8FC-AC1667EBCBE1}">
-                <a14:hiddenEffects xmlns:a14="http://schemas.microsoft.com/office/drawing/2010/main" xmlns="">
+                <a14:hiddenEffects xmlns="" xmlns:a14="http://schemas.microsoft.com/office/drawing/2010/main">
                   <a:effectLst>
                     <a:outerShdw blurRad="63500" dist="38099" dir="2700000" algn="ctr" rotWithShape="0">
                       <a:srgbClr val="000000">
@@ -15620,7 +15620,7 @@
             <a:effectLst/>
             <a:extLst>
               <a:ext uri="{91240B29-F687-4f45-9708-019B960494DF}">
-                <a14:hiddenLine xmlns:a14="http://schemas.microsoft.com/office/drawing/2010/main" xmlns="" w="9525" cap="flat">
+                <a14:hiddenLine xmlns="" xmlns:a14="http://schemas.microsoft.com/office/drawing/2010/main" w="9525" cap="flat">
                   <a:solidFill>
                     <a:srgbClr val="808080"/>
                   </a:solidFill>
@@ -15630,7 +15630,7 @@
                 </a14:hiddenLine>
               </a:ext>
               <a:ext uri="{AF507438-7753-43e0-B8FC-AC1667EBCBE1}">
-                <a14:hiddenEffects xmlns:a14="http://schemas.microsoft.com/office/drawing/2010/main" xmlns="">
+                <a14:hiddenEffects xmlns="" xmlns:a14="http://schemas.microsoft.com/office/drawing/2010/main">
                   <a:effectLst>
                     <a:outerShdw blurRad="63500" dist="38099" dir="2700000" algn="ctr" rotWithShape="0">
                       <a:srgbClr val="000000">
@@ -15816,7 +15816,7 @@
             <a:effectLst/>
             <a:extLst>
               <a:ext uri="{91240B29-F687-4f45-9708-019B960494DF}">
-                <a14:hiddenLine xmlns:a14="http://schemas.microsoft.com/office/drawing/2010/main" xmlns="" w="9525" cap="flat">
+                <a14:hiddenLine xmlns="" xmlns:a14="http://schemas.microsoft.com/office/drawing/2010/main" w="9525" cap="flat">
                   <a:solidFill>
                     <a:srgbClr val="808080"/>
                   </a:solidFill>
@@ -15826,7 +15826,7 @@
                 </a14:hiddenLine>
               </a:ext>
               <a:ext uri="{AF507438-7753-43e0-B8FC-AC1667EBCBE1}">
-                <a14:hiddenEffects xmlns:a14="http://schemas.microsoft.com/office/drawing/2010/main" xmlns="">
+                <a14:hiddenEffects xmlns="" xmlns:a14="http://schemas.microsoft.com/office/drawing/2010/main">
                   <a:effectLst>
                     <a:outerShdw blurRad="63500" dist="38099" dir="2700000" algn="ctr" rotWithShape="0">
                       <a:srgbClr val="000000">
@@ -15954,7 +15954,7 @@
             <a:effectLst/>
             <a:extLst>
               <a:ext uri="{91240B29-F687-4f45-9708-019B960494DF}">
-                <a14:hiddenLine xmlns:a14="http://schemas.microsoft.com/office/drawing/2010/main" xmlns="" w="9525" cap="flat">
+                <a14:hiddenLine xmlns="" xmlns:a14="http://schemas.microsoft.com/office/drawing/2010/main" w="9525" cap="flat">
                   <a:solidFill>
                     <a:srgbClr val="808080"/>
                   </a:solidFill>
@@ -15964,7 +15964,7 @@
                 </a14:hiddenLine>
               </a:ext>
               <a:ext uri="{AF507438-7753-43e0-B8FC-AC1667EBCBE1}">
-                <a14:hiddenEffects xmlns:a14="http://schemas.microsoft.com/office/drawing/2010/main" xmlns="">
+                <a14:hiddenEffects xmlns="" xmlns:a14="http://schemas.microsoft.com/office/drawing/2010/main">
                   <a:effectLst>
                     <a:outerShdw blurRad="63500" dist="38099" dir="2700000" algn="ctr" rotWithShape="0">
                       <a:srgbClr val="000000">
@@ -16083,7 +16083,7 @@
             <a:effectLst/>
             <a:extLst>
               <a:ext uri="{91240B29-F687-4f45-9708-019B960494DF}">
-                <a14:hiddenLine xmlns:a14="http://schemas.microsoft.com/office/drawing/2010/main" xmlns="" w="9525" cap="flat">
+                <a14:hiddenLine xmlns="" xmlns:a14="http://schemas.microsoft.com/office/drawing/2010/main" w="9525" cap="flat">
                   <a:solidFill>
                     <a:srgbClr val="808080"/>
                   </a:solidFill>
@@ -16093,7 +16093,7 @@
                 </a14:hiddenLine>
               </a:ext>
               <a:ext uri="{AF507438-7753-43e0-B8FC-AC1667EBCBE1}">
-                <a14:hiddenEffects xmlns:a14="http://schemas.microsoft.com/office/drawing/2010/main" xmlns="">
+                <a14:hiddenEffects xmlns="" xmlns:a14="http://schemas.microsoft.com/office/drawing/2010/main">
                   <a:effectLst>
                     <a:outerShdw blurRad="63500" dist="38099" dir="2700000" algn="ctr" rotWithShape="0">
                       <a:srgbClr val="000000">
@@ -16239,7 +16239,7 @@
             <a:effectLst/>
             <a:extLst>
               <a:ext uri="{91240B29-F687-4f45-9708-019B960494DF}">
-                <a14:hiddenLine xmlns:a14="http://schemas.microsoft.com/office/drawing/2010/main" xmlns="" w="9525" cap="flat">
+                <a14:hiddenLine xmlns="" xmlns:a14="http://schemas.microsoft.com/office/drawing/2010/main" w="9525" cap="flat">
                   <a:solidFill>
                     <a:srgbClr val="808080"/>
                   </a:solidFill>
@@ -16249,7 +16249,7 @@
                 </a14:hiddenLine>
               </a:ext>
               <a:ext uri="{AF507438-7753-43e0-B8FC-AC1667EBCBE1}">
-                <a14:hiddenEffects xmlns:a14="http://schemas.microsoft.com/office/drawing/2010/main" xmlns="">
+                <a14:hiddenEffects xmlns="" xmlns:a14="http://schemas.microsoft.com/office/drawing/2010/main">
                   <a:effectLst>
                     <a:outerShdw blurRad="63500" dist="38099" dir="2700000" algn="ctr" rotWithShape="0">
                       <a:srgbClr val="000000">
@@ -16429,7 +16429,7 @@
             <a:effectLst/>
             <a:extLst>
               <a:ext uri="{91240B29-F687-4f45-9708-019B960494DF}">
-                <a14:hiddenLine xmlns:a14="http://schemas.microsoft.com/office/drawing/2010/main" xmlns="" w="9525" cap="flat">
+                <a14:hiddenLine xmlns="" xmlns:a14="http://schemas.microsoft.com/office/drawing/2010/main" w="9525" cap="flat">
                   <a:solidFill>
                     <a:srgbClr val="808080"/>
                   </a:solidFill>
@@ -16439,7 +16439,7 @@
                 </a14:hiddenLine>
               </a:ext>
               <a:ext uri="{AF507438-7753-43e0-B8FC-AC1667EBCBE1}">
-                <a14:hiddenEffects xmlns:a14="http://schemas.microsoft.com/office/drawing/2010/main" xmlns="">
+                <a14:hiddenEffects xmlns="" xmlns:a14="http://schemas.microsoft.com/office/drawing/2010/main">
                   <a:effectLst>
                     <a:outerShdw blurRad="63500" dist="38099" dir="2700000" algn="ctr" rotWithShape="0">
                       <a:srgbClr val="000000">
@@ -19913,14 +19913,14 @@
           </a:ln>
           <a:extLst>
             <a:ext uri="{909E8E84-426E-40dd-AFC4-6F175D3DCCD1}">
-              <a14:hiddenFill xmlns:a14="http://schemas.microsoft.com/office/drawing/2010/main" xmlns="">
+              <a14:hiddenFill xmlns="" xmlns:a14="http://schemas.microsoft.com/office/drawing/2010/main">
                 <a:solidFill>
                   <a:srgbClr val="FFFFFF"/>
                 </a:solidFill>
               </a14:hiddenFill>
             </a:ext>
             <a:ext uri="{91240B29-F687-4f45-9708-019B960494DF}">
-              <a14:hiddenLine xmlns:a14="http://schemas.microsoft.com/office/drawing/2010/main" xmlns="" w="9525">
+              <a14:hiddenLine xmlns="" xmlns:a14="http://schemas.microsoft.com/office/drawing/2010/main" w="9525">
                 <a:solidFill>
                   <a:srgbClr val="000000"/>
                 </a:solidFill>
@@ -19930,7 +19930,7 @@
               </a14:hiddenLine>
             </a:ext>
             <a:ext uri="{FAA26D3D-D897-4be2-8F04-BA451C77F1D7}">
-              <ma14:placeholderFlag xmlns:ma14="http://schemas.microsoft.com/office/mac/drawingml/2011/main" xmlns="" val="1"/>
+              <ma14:placeholderFlag xmlns="" xmlns:ma14="http://schemas.microsoft.com/office/mac/drawingml/2011/main" val="1"/>
             </a:ext>
           </a:extLst>
         </p:spPr>
@@ -19975,14 +19975,14 @@
           </a:ln>
           <a:extLst>
             <a:ext uri="{909E8E84-426E-40dd-AFC4-6F175D3DCCD1}">
-              <a14:hiddenFill xmlns:a14="http://schemas.microsoft.com/office/drawing/2010/main" xmlns="">
+              <a14:hiddenFill xmlns="" xmlns:a14="http://schemas.microsoft.com/office/drawing/2010/main">
                 <a:solidFill>
                   <a:srgbClr val="FFFFFF"/>
                 </a:solidFill>
               </a14:hiddenFill>
             </a:ext>
             <a:ext uri="{91240B29-F687-4f45-9708-019B960494DF}">
-              <a14:hiddenLine xmlns:a14="http://schemas.microsoft.com/office/drawing/2010/main" xmlns="" w="9525">
+              <a14:hiddenLine xmlns="" xmlns:a14="http://schemas.microsoft.com/office/drawing/2010/main" w="9525">
                 <a:solidFill>
                   <a:srgbClr val="000000"/>
                 </a:solidFill>
@@ -19992,7 +19992,7 @@
               </a14:hiddenLine>
             </a:ext>
             <a:ext uri="{FAA26D3D-D897-4be2-8F04-BA451C77F1D7}">
-              <ma14:placeholderFlag xmlns:ma14="http://schemas.microsoft.com/office/mac/drawingml/2011/main" xmlns="" val="1"/>
+              <ma14:placeholderFlag xmlns="" xmlns:ma14="http://schemas.microsoft.com/office/mac/drawingml/2011/main" val="1"/>
             </a:ext>
           </a:extLst>
         </p:spPr>
@@ -21811,27 +21811,52 @@
           </a:p>
           <a:p>
             <a:r>
+              <a:rPr lang="en-US"/>
+              <a:t>Option</a:t>
+            </a:r>
+            <a:r>
               <a:rPr lang="en-US" smtClean="0"/>
-              <a:t>Option 2: install the missing package yourself in an R session using </a:t>
+              <a:t> 2: install the missing package yourself in an R session using </a:t>
             </a:r>
             <a:r>
               <a:rPr lang="en-US" smtClean="0">
                 <a:latin typeface="Consolas" panose="020B0609020204030204" pitchFamily="49" charset="0"/>
                 <a:cs typeface="Consolas" panose="020B0609020204030204" pitchFamily="49" charset="0"/>
               </a:rPr>
-              <a:t>install.packages() </a:t>
+              <a:t>install.packages</a:t>
             </a:r>
             <a:r>
               <a:rPr lang="en-US" smtClean="0">
-                <a:latin typeface="+mn-lt"/>
+                <a:latin typeface="Consolas" panose="020B0609020204030204" pitchFamily="49" charset="0"/>
                 <a:cs typeface="Consolas" panose="020B0609020204030204" pitchFamily="49" charset="0"/>
               </a:rPr>
-              <a:t>or biocLite() for Bioconductor packages (or in fact any other way possible)</a:t>
-            </a:r>
-            <a:endParaRPr lang="en-US" smtClean="0">
-              <a:latin typeface="Consolas" panose="020B0609020204030204" pitchFamily="49" charset="0"/>
-              <a:cs typeface="Consolas" panose="020B0609020204030204" pitchFamily="49" charset="0"/>
-            </a:endParaRPr>
+              <a:t>() </a:t>
+            </a:r>
+            <a:r>
+              <a:rPr lang="en-US" smtClean="0"/>
+              <a:t>or </a:t>
+            </a:r>
+            <a:r>
+              <a:rPr lang="en-US">
+                <a:latin typeface="Consolas" panose="020B0609020204030204" pitchFamily="49" charset="0"/>
+                <a:cs typeface="Consolas" panose="020B0609020204030204" pitchFamily="49" charset="0"/>
+              </a:rPr>
+              <a:t>biocLite()</a:t>
+            </a:r>
+            <a:r>
+              <a:rPr lang="en-US">
+                <a:latin typeface="Corbel" panose="020B0503020204020204" pitchFamily="34" charset="0"/>
+                <a:cs typeface="Consolas" panose="020B0609020204030204" pitchFamily="49" charset="0"/>
+              </a:rPr>
+              <a:t> </a:t>
+            </a:r>
+            <a:r>
+              <a:rPr lang="en-US" smtClean="0">
+                <a:latin typeface="Corbel" panose="020B0503020204020204" pitchFamily="34" charset="0"/>
+                <a:cs typeface="Consolas" panose="020B0609020204030204" pitchFamily="49" charset="0"/>
+              </a:rPr>
+              <a:t>for Bioconductor packages (or in fact any other way possible)</a:t>
+            </a:r>
           </a:p>
           <a:p>
             <a:pPr lvl="1"/>
@@ -22318,13 +22343,7 @@
               <a:rPr lang="en-US">
                 <a:hlinkClick r:id="rId3"/>
               </a:rPr>
-              <a:t>https</a:t>
-            </a:r>
-            <a:r>
-              <a:rPr lang="en-US">
-                <a:hlinkClick r:id="rId3"/>
-              </a:rPr>
-              <a:t>://</a:t>
+              <a:t>https://</a:t>
             </a:r>
             <a:r>
               <a:rPr lang="en-US" smtClean="0">
@@ -22339,13 +22358,7 @@
               <a:rPr lang="en-US">
                 <a:hlinkClick r:id="rId4"/>
               </a:rPr>
-              <a:t>https</a:t>
-            </a:r>
-            <a:r>
-              <a:rPr lang="en-US">
-                <a:hlinkClick r:id="rId4"/>
-              </a:rPr>
-              <a:t>://</a:t>
+              <a:t>https://</a:t>
             </a:r>
             <a:r>
               <a:rPr lang="en-US" smtClean="0">
@@ -22502,13 +22515,7 @@
               <a:rPr lang="en-US">
                 <a:hlinkClick r:id="rId2"/>
               </a:rPr>
-              <a:t>https</a:t>
-            </a:r>
-            <a:r>
-              <a:rPr lang="en-US">
-                <a:hlinkClick r:id="rId2"/>
-              </a:rPr>
-              <a:t>://</a:t>
+              <a:t>https://</a:t>
             </a:r>
             <a:r>
               <a:rPr lang="en-US" smtClean="0">
@@ -22523,13 +22530,7 @@
               <a:rPr lang="en-US">
                 <a:hlinkClick r:id="rId3"/>
               </a:rPr>
-              <a:t>https</a:t>
-            </a:r>
-            <a:r>
-              <a:rPr lang="en-US">
-                <a:hlinkClick r:id="rId3"/>
-              </a:rPr>
-              <a:t>://</a:t>
+              <a:t>https://</a:t>
             </a:r>
             <a:r>
               <a:rPr lang="en-US" smtClean="0">
@@ -22544,13 +22545,7 @@
               <a:rPr lang="en-US">
                 <a:hlinkClick r:id="rId4"/>
               </a:rPr>
-              <a:t>https</a:t>
-            </a:r>
-            <a:r>
-              <a:rPr lang="en-US">
-                <a:hlinkClick r:id="rId4"/>
-              </a:rPr>
-              <a:t>://</a:t>
+              <a:t>https://</a:t>
             </a:r>
             <a:r>
               <a:rPr lang="en-US" smtClean="0">
@@ -22907,13 +22902,7 @@
               <a:rPr lang="en-US">
                 <a:hlinkClick r:id="rId2"/>
               </a:rPr>
-              <a:t>https://research.csc.fi</a:t>
-            </a:r>
-            <a:r>
-              <a:rPr lang="en-US">
-                <a:hlinkClick r:id="rId2"/>
-              </a:rPr>
-              <a:t>/-/</a:t>
+              <a:t>https://research.csc.fi/-/</a:t>
             </a:r>
             <a:r>
               <a:rPr lang="en-US" smtClean="0">
@@ -22928,13 +22917,7 @@
               <a:rPr lang="en-US">
                 <a:hlinkClick r:id="rId3"/>
               </a:rPr>
-              <a:t>https</a:t>
-            </a:r>
-            <a:r>
-              <a:rPr lang="en-US">
-                <a:hlinkClick r:id="rId3"/>
-              </a:rPr>
-              <a:t>://</a:t>
+              <a:t>https://</a:t>
             </a:r>
             <a:r>
               <a:rPr lang="en-US" smtClean="0">
@@ -22974,8 +22957,19 @@
                 <a:latin typeface="Consolas" panose="020B0609020204030204" pitchFamily="49" charset="0"/>
                 <a:cs typeface="Consolas" panose="020B0609020204030204" pitchFamily="49" charset="0"/>
               </a:rPr>
-              <a:t>module load r-env</a:t>
-            </a:r>
+              <a:t>module load </a:t>
+            </a:r>
+            <a:r>
+              <a:rPr lang="en-US" smtClean="0">
+                <a:latin typeface="Consolas" panose="020B0609020204030204" pitchFamily="49" charset="0"/>
+                <a:cs typeface="Consolas" panose="020B0609020204030204" pitchFamily="49" charset="0"/>
+              </a:rPr>
+              <a:t>r-env</a:t>
+            </a:r>
+            <a:endParaRPr lang="en-US" smtClean="0">
+              <a:latin typeface="Consolas" panose="020B0609020204030204" pitchFamily="49" charset="0"/>
+              <a:cs typeface="Consolas" panose="020B0609020204030204" pitchFamily="49" charset="0"/>
+            </a:endParaRPr>
           </a:p>
           <a:p>
             <a:pPr marL="457200" indent="-457200">
@@ -22987,7 +22981,14 @@
                 <a:latin typeface="+mn-lt"/>
                 <a:cs typeface="Consolas" panose="020B0609020204030204" pitchFamily="49" charset="0"/>
               </a:rPr>
-              <a:t>type: </a:t>
+              <a:t>type</a:t>
+            </a:r>
+            <a:r>
+              <a:rPr lang="en-US" smtClean="0">
+                <a:latin typeface="+mn-lt"/>
+                <a:cs typeface="Consolas" panose="020B0609020204030204" pitchFamily="49" charset="0"/>
+              </a:rPr>
+              <a:t>: </a:t>
             </a:r>
             <a:r>
               <a:rPr lang="en-US" smtClean="0">
@@ -23158,13 +23159,7 @@
               <a:rPr lang="en-US">
                 <a:hlinkClick r:id="rId2"/>
               </a:rPr>
-              <a:t>https</a:t>
-            </a:r>
-            <a:r>
-              <a:rPr lang="en-US">
-                <a:hlinkClick r:id="rId2"/>
-              </a:rPr>
-              <a:t>://</a:t>
+              <a:t>https://</a:t>
             </a:r>
             <a:r>
               <a:rPr lang="en-US" smtClean="0">
@@ -23363,11 +23358,7 @@
           <a:p>
             <a:r>
               <a:rPr lang="en-US"/>
-              <a:t>QGIS (on NoMachine or -X terminal, </a:t>
-            </a:r>
-            <a:r>
-              <a:rPr lang="en-US"/>
-              <a:t>slow</a:t>
+              <a:t>QGIS (on NoMachine or -X terminal, slow</a:t>
             </a:r>
             <a:r>
               <a:rPr lang="en-US" smtClean="0"/>
@@ -23513,22 +23504,19 @@
                 <a:latin typeface="Consolas" panose="020B0609020204030204" pitchFamily="49" charset="0"/>
                 <a:cs typeface="Consolas" panose="020B0609020204030204" pitchFamily="49" charset="0"/>
               </a:rPr>
-              <a:t>module </a:t>
-            </a:r>
-            <a:r>
-              <a:rPr lang="fi-FI">
-                <a:latin typeface="Consolas" panose="020B0609020204030204" pitchFamily="49" charset="0"/>
-                <a:cs typeface="Consolas" panose="020B0609020204030204" pitchFamily="49" charset="0"/>
-              </a:rPr>
-              <a:t>load </a:t>
+              <a:t>module load </a:t>
             </a:r>
             <a:r>
               <a:rPr lang="fi-FI" smtClean="0">
                 <a:latin typeface="Consolas" panose="020B0609020204030204" pitchFamily="49" charset="0"/>
                 <a:cs typeface="Consolas" panose="020B0609020204030204" pitchFamily="49" charset="0"/>
               </a:rPr>
-              <a:t>r-env saga</a:t>
-            </a:r>
+              <a:t>rspatial-env</a:t>
+            </a:r>
+            <a:endParaRPr lang="fi-FI" smtClean="0">
+              <a:latin typeface="Consolas" panose="020B0609020204030204" pitchFamily="49" charset="0"/>
+              <a:cs typeface="Consolas" panose="020B0609020204030204" pitchFamily="49" charset="0"/>
+            </a:endParaRPr>
           </a:p>
           <a:p>
             <a:r>
@@ -23537,11 +23525,7 @@
             </a:r>
             <a:r>
               <a:rPr lang="fi-FI"/>
-              <a:t>RSAGA and </a:t>
-            </a:r>
-            <a:r>
-              <a:rPr lang="fi-FI"/>
-              <a:t>rgdal </a:t>
+              <a:t>RSAGA and rgdal </a:t>
             </a:r>
             <a:r>
               <a:rPr lang="fi-FI" smtClean="0"/>
@@ -23607,19 +23591,8 @@
                 <a:latin typeface="Consolas" panose="020B0609020204030204" pitchFamily="49" charset="0"/>
                 <a:cs typeface="Consolas" panose="020B0609020204030204" pitchFamily="49" charset="0"/>
               </a:rPr>
-              <a:t>GDALinfo(file.path(getwd(), 'V4142.tif')[1</a:t>
-            </a:r>
-            <a:r>
-              <a:rPr lang="fi-FI">
-                <a:latin typeface="Consolas" panose="020B0609020204030204" pitchFamily="49" charset="0"/>
-                <a:cs typeface="Consolas" panose="020B0609020204030204" pitchFamily="49" charset="0"/>
-              </a:rPr>
-              <a:t>]) </a:t>
-            </a:r>
-            <a:endParaRPr lang="fi-FI">
-              <a:latin typeface="Consolas" panose="020B0609020204030204" pitchFamily="49" charset="0"/>
-              <a:cs typeface="Consolas" panose="020B0609020204030204" pitchFamily="49" charset="0"/>
-            </a:endParaRPr>
+              <a:t>GDALinfo(file.path(getwd(), 'V4142.tif')[1]) </a:t>
+            </a:r>
           </a:p>
         </p:txBody>
       </p:sp>
@@ -24792,6 +24765,53 @@
 </file>
 
 <file path=customXml/item2.xml><?xml version="1.0" encoding="utf-8"?>
+<p:properties xmlns:p="http://schemas.microsoft.com/office/2006/metadata/properties" xmlns:xsi="http://www.w3.org/2001/XMLSchema-instance" xmlns:pc="http://schemas.microsoft.com/office/infopath/2007/PartnerControls">
+  <documentManagement>
+    <PublishingRollupImage xmlns="http://schemas.microsoft.com/sharepoint/v3" xsi:nil="true"/>
+    <CSC_x0020_Language xmlns="b542780c-f3c1-48de-9090-e65480539529">
+      <Value>Finnish</Value>
+      <Value>English</Value>
+    </CSC_x0020_Language>
+    <Translation xmlns="b542780c-f3c1-48de-9090-e65480539529">
+      <Url xsi:nil="true"/>
+      <Description xsi:nil="true"/>
+    </Translation>
+    <PublishingContactEmail xmlns="http://schemas.microsoft.com/sharepoint/v3" xsi:nil="true"/>
+    <PublishingPageContent xmlns="http://schemas.microsoft.com/sharepoint/v3" xsi:nil="true"/>
+    <PublishingVariationRelationshipLinkFieldID xmlns="http://schemas.microsoft.com/sharepoint/v3">
+      <Url xsi:nil="true"/>
+      <Description xsi:nil="true"/>
+    </PublishingVariationRelationshipLinkFieldID>
+    <CSC_x0020_Category xmlns="b542780c-f3c1-48de-9090-e65480539529">Templates</CSC_x0020_Category>
+    <SeoKeywords xmlns="http://schemas.microsoft.com/sharepoint/v3" xsi:nil="true"/>
+    <PublishingVariationGroupID xmlns="http://schemas.microsoft.com/sharepoint/v3" xsi:nil="true"/>
+    <PublishingIsFurlPage xmlns="http://schemas.microsoft.com/sharepoint/v3">false</PublishingIsFurlPage>
+    <Audience xmlns="http://schemas.microsoft.com/sharepoint/v3" xsi:nil="true"/>
+    <CSC_x0020_Group xmlns="b542780c-f3c1-48de-9090-e65480539529">MARCOM</CSC_x0020_Group>
+    <SeoBrowserTitle xmlns="http://schemas.microsoft.com/sharepoint/v3" xsi:nil="true"/>
+    <PublishingExpirationDate xmlns="http://schemas.microsoft.com/sharepoint/v3" xsi:nil="true"/>
+    <PublishingContactPicture xmlns="http://schemas.microsoft.com/sharepoint/v3">
+      <Url xsi:nil="true"/>
+      <Description xsi:nil="true"/>
+    </PublishingContactPicture>
+    <SeoRobotsNoIndex xmlns="http://schemas.microsoft.com/sharepoint/v3" xsi:nil="true"/>
+    <PublishingStartDate xmlns="http://schemas.microsoft.com/sharepoint/v3" xsi:nil="true"/>
+    <SeoMetaDescription xmlns="http://schemas.microsoft.com/sharepoint/v3" xsi:nil="true"/>
+    <PublishingContact xmlns="http://schemas.microsoft.com/sharepoint/v3">
+      <UserInfo>
+        <DisplayName/>
+        <AccountId xsi:nil="true"/>
+        <AccountType/>
+      </UserInfo>
+    </PublishingContact>
+    <PublishingContactName xmlns="http://schemas.microsoft.com/sharepoint/v3" xsi:nil="true"/>
+    <Comments xmlns="http://schemas.microsoft.com/sharepoint/v3">CSC's official PowerPoint-template
+Version 04.11.2016/Marketing and Communications</Comments>
+  </documentManagement>
+</p:properties>
+</file>
+
+<file path=customXml/item3.xml><?xml version="1.0" encoding="utf-8"?>
 <ct:contentTypeSchema xmlns:ct="http://schemas.microsoft.com/office/2006/metadata/contentType" xmlns:ma="http://schemas.microsoft.com/office/2006/metadata/properties/metaAttributes" ct:_="" ma:_="" ma:contentTypeName="Guidelines Article" ma:contentTypeID="0x010100C568DB52D9D0A14D9B2FDCC96666E9F2007948130EC3DB064584E219954237AF39005865AF1693B9994CA07D29D3EBFFF69500D5CFB1A256BDC0439FEF5B0324F021D6" ma:contentTypeVersion="30" ma:contentTypeDescription="" ma:contentTypeScope="" ma:versionID="4cb75ce876bc9bb0bf3ca65d73c8002f">
   <xsd:schema xmlns:xsd="http://www.w3.org/2001/XMLSchema" xmlns:xs="http://www.w3.org/2001/XMLSchema" xmlns:p="http://schemas.microsoft.com/office/2006/metadata/properties" xmlns:ns1="http://schemas.microsoft.com/sharepoint/v3" xmlns:ns3="b542780c-f3c1-48de-9090-e65480539529" targetNamespace="http://schemas.microsoft.com/office/2006/metadata/properties" ma:root="true" ma:fieldsID="179bbc1ef3caf76c6e1127b99eabb6f9" ns1:_="" ns3:_="">
     <xsd:import namespace="http://schemas.microsoft.com/sharepoint/v3"/>
@@ -25168,53 +25188,6 @@
 </ct:contentTypeSchema>
 </file>
 
-<file path=customXml/item3.xml><?xml version="1.0" encoding="utf-8"?>
-<p:properties xmlns:p="http://schemas.microsoft.com/office/2006/metadata/properties" xmlns:xsi="http://www.w3.org/2001/XMLSchema-instance" xmlns:pc="http://schemas.microsoft.com/office/infopath/2007/PartnerControls">
-  <documentManagement>
-    <PublishingRollupImage xmlns="http://schemas.microsoft.com/sharepoint/v3" xsi:nil="true"/>
-    <CSC_x0020_Language xmlns="b542780c-f3c1-48de-9090-e65480539529">
-      <Value>Finnish</Value>
-      <Value>English</Value>
-    </CSC_x0020_Language>
-    <Translation xmlns="b542780c-f3c1-48de-9090-e65480539529">
-      <Url xsi:nil="true"/>
-      <Description xsi:nil="true"/>
-    </Translation>
-    <PublishingContactEmail xmlns="http://schemas.microsoft.com/sharepoint/v3" xsi:nil="true"/>
-    <PublishingPageContent xmlns="http://schemas.microsoft.com/sharepoint/v3" xsi:nil="true"/>
-    <PublishingVariationRelationshipLinkFieldID xmlns="http://schemas.microsoft.com/sharepoint/v3">
-      <Url xsi:nil="true"/>
-      <Description xsi:nil="true"/>
-    </PublishingVariationRelationshipLinkFieldID>
-    <CSC_x0020_Category xmlns="b542780c-f3c1-48de-9090-e65480539529">Templates</CSC_x0020_Category>
-    <SeoKeywords xmlns="http://schemas.microsoft.com/sharepoint/v3" xsi:nil="true"/>
-    <PublishingVariationGroupID xmlns="http://schemas.microsoft.com/sharepoint/v3" xsi:nil="true"/>
-    <PublishingIsFurlPage xmlns="http://schemas.microsoft.com/sharepoint/v3">false</PublishingIsFurlPage>
-    <Audience xmlns="http://schemas.microsoft.com/sharepoint/v3" xsi:nil="true"/>
-    <CSC_x0020_Group xmlns="b542780c-f3c1-48de-9090-e65480539529">MARCOM</CSC_x0020_Group>
-    <SeoBrowserTitle xmlns="http://schemas.microsoft.com/sharepoint/v3" xsi:nil="true"/>
-    <PublishingExpirationDate xmlns="http://schemas.microsoft.com/sharepoint/v3" xsi:nil="true"/>
-    <PublishingContactPicture xmlns="http://schemas.microsoft.com/sharepoint/v3">
-      <Url xsi:nil="true"/>
-      <Description xsi:nil="true"/>
-    </PublishingContactPicture>
-    <SeoRobotsNoIndex xmlns="http://schemas.microsoft.com/sharepoint/v3" xsi:nil="true"/>
-    <PublishingStartDate xmlns="http://schemas.microsoft.com/sharepoint/v3" xsi:nil="true"/>
-    <SeoMetaDescription xmlns="http://schemas.microsoft.com/sharepoint/v3" xsi:nil="true"/>
-    <PublishingContact xmlns="http://schemas.microsoft.com/sharepoint/v3">
-      <UserInfo>
-        <DisplayName/>
-        <AccountId xsi:nil="true"/>
-        <AccountType/>
-      </UserInfo>
-    </PublishingContact>
-    <PublishingContactName xmlns="http://schemas.microsoft.com/sharepoint/v3" xsi:nil="true"/>
-    <Comments xmlns="http://schemas.microsoft.com/sharepoint/v3">CSC's official PowerPoint-template
-Version 04.11.2016/Marketing and Communications</Comments>
-  </documentManagement>
-</p:properties>
-</file>
-
 <file path=customXml/itemProps1.xml><?xml version="1.0" encoding="utf-8"?>
 <ds:datastoreItem xmlns:ds="http://schemas.openxmlformats.org/officeDocument/2006/customXml" ds:itemID="{D4C4CBFC-2EF1-4092-8F2F-5A5B86A85C2F}">
   <ds:schemaRefs>
@@ -25224,6 +25197,23 @@
 </file>
 
 <file path=customXml/itemProps2.xml><?xml version="1.0" encoding="utf-8"?>
+<ds:datastoreItem xmlns:ds="http://schemas.openxmlformats.org/officeDocument/2006/customXml" ds:itemID="{47279921-A1B4-472D-B7BD-F638B6892104}">
+  <ds:schemaRefs>
+    <ds:schemaRef ds:uri="http://www.w3.org/XML/1998/namespace"/>
+    <ds:schemaRef ds:uri="http://schemas.openxmlformats.org/package/2006/metadata/core-properties"/>
+    <ds:schemaRef ds:uri="http://purl.org/dc/dcmitype/"/>
+    <ds:schemaRef ds:uri="http://schemas.microsoft.com/office/2006/documentManagement/types"/>
+    <ds:schemaRef ds:uri="http://schemas.microsoft.com/office/2006/metadata/properties"/>
+    <ds:schemaRef ds:uri="http://purl.org/dc/terms/"/>
+    <ds:schemaRef ds:uri="http://schemas.microsoft.com/office/infopath/2007/PartnerControls"/>
+    <ds:schemaRef ds:uri="http://purl.org/dc/elements/1.1/"/>
+    <ds:schemaRef ds:uri="b542780c-f3c1-48de-9090-e65480539529"/>
+    <ds:schemaRef ds:uri="http://schemas.microsoft.com/sharepoint/v3"/>
+  </ds:schemaRefs>
+</ds:datastoreItem>
+</file>
+
+<file path=customXml/itemProps3.xml><?xml version="1.0" encoding="utf-8"?>
 <ds:datastoreItem xmlns:ds="http://schemas.openxmlformats.org/officeDocument/2006/customXml" ds:itemID="{652D4B87-A129-49B6-A00B-E280DAE4F0D2}">
   <ds:schemaRefs>
     <ds:schemaRef ds:uri="http://schemas.microsoft.com/office/2006/metadata/contentType"/>
@@ -25240,21 +25230,4 @@
     <ds:schemaRef ds:uri="http://schemas.microsoft.com/internal/obd"/>
   </ds:schemaRefs>
 </ds:datastoreItem>
-</file>
-
-<file path=customXml/itemProps3.xml><?xml version="1.0" encoding="utf-8"?>
-<ds:datastoreItem xmlns:ds="http://schemas.openxmlformats.org/officeDocument/2006/customXml" ds:itemID="{47279921-A1B4-472D-B7BD-F638B6892104}">
-  <ds:schemaRefs>
-    <ds:schemaRef ds:uri="http://www.w3.org/XML/1998/namespace"/>
-    <ds:schemaRef ds:uri="http://schemas.openxmlformats.org/package/2006/metadata/core-properties"/>
-    <ds:schemaRef ds:uri="http://purl.org/dc/dcmitype/"/>
-    <ds:schemaRef ds:uri="http://schemas.microsoft.com/office/2006/documentManagement/types"/>
-    <ds:schemaRef ds:uri="http://schemas.microsoft.com/office/2006/metadata/properties"/>
-    <ds:schemaRef ds:uri="http://purl.org/dc/terms/"/>
-    <ds:schemaRef ds:uri="http://schemas.microsoft.com/office/infopath/2007/PartnerControls"/>
-    <ds:schemaRef ds:uri="http://purl.org/dc/elements/1.1/"/>
-    <ds:schemaRef ds:uri="b542780c-f3c1-48de-9090-e65480539529"/>
-    <ds:schemaRef ds:uri="http://schemas.microsoft.com/sharepoint/v3"/>
-  </ds:schemaRefs>
-</ds:datastoreItem>
 </file>
</xml_diff>